<commit_message>
00:22 Chapter 17 Picking PPT Upload2(PGW)
</commit_message>
<xml_diff>
--- a/Common/Chapter17 Picking.pptx
+++ b/Common/Chapter17 Picking.pptx
@@ -5,16 +5,18 @@
     <p:sldMasterId id="2147483648" r:id="rId1"/>
   </p:sldMasterIdLst>
   <p:notesMasterIdLst>
-    <p:notesMasterId r:id="rId6"/>
+    <p:notesMasterId r:id="rId8"/>
   </p:notesMasterIdLst>
   <p:handoutMasterIdLst>
-    <p:handoutMasterId r:id="rId7"/>
+    <p:handoutMasterId r:id="rId9"/>
   </p:handoutMasterIdLst>
   <p:sldIdLst>
     <p:sldId id="261" r:id="rId2"/>
     <p:sldId id="273" r:id="rId3"/>
     <p:sldId id="257" r:id="rId4"/>
     <p:sldId id="281" r:id="rId5"/>
+    <p:sldId id="282" r:id="rId6"/>
+    <p:sldId id="283" r:id="rId7"/>
   </p:sldIdLst>
   <p:sldSz cx="12192000" cy="6858000"/>
   <p:notesSz cx="6858000" cy="9144000"/>
@@ -225,7 +227,7 @@
                 <a:latin typeface="맑은 고딕" panose="020B0503020000020004" pitchFamily="50" charset="-127"/>
                 <a:ea typeface="맑은 고딕" panose="020B0503020000020004" pitchFamily="50" charset="-127"/>
               </a:rPr>
-              <a:t>2019년 7월 15일</a:t>
+              <a:t>2019년 7월 16일</a:t>
             </a:fld>
             <a:endParaRPr lang="ko-KR" altLang="en-US" dirty="0">
               <a:latin typeface="맑은 고딕" panose="020B0503020000020004" pitchFamily="50" charset="-127"/>
@@ -411,7 +413,7 @@
             <a:fld id="{BE16EC8A-0758-4FA9-BF4D-3119057076D1}" type="datetime4">
               <a:rPr lang="ko-KR" altLang="en-US" smtClean="0"/>
               <a:pPr/>
-              <a:t>2019년 7월 15일</a:t>
+              <a:t>2019년 7월 16일</a:t>
             </a:fld>
             <a:endParaRPr lang="ko-KR" altLang="en-US" dirty="0"/>
           </a:p>
@@ -1434,6 +1436,244 @@
 </p:notes>
 </file>
 
+<file path=ppt/notesSlides/notesSlide5.xml><?xml version="1.0" encoding="utf-8"?>
+<p:notes xmlns:a="http://schemas.openxmlformats.org/drawingml/2006/main" xmlns:r="http://schemas.openxmlformats.org/officeDocument/2006/relationships" xmlns:p="http://schemas.openxmlformats.org/presentationml/2006/main">
+  <p:cSld>
+    <p:spTree>
+      <p:nvGrpSpPr>
+        <p:cNvPr id="1" name=""/>
+        <p:cNvGrpSpPr/>
+        <p:nvPr/>
+      </p:nvGrpSpPr>
+      <p:grpSpPr>
+        <a:xfrm>
+          <a:off x="0" y="0"/>
+          <a:ext cx="0" cy="0"/>
+          <a:chOff x="0" y="0"/>
+          <a:chExt cx="0" cy="0"/>
+        </a:xfrm>
+      </p:grpSpPr>
+      <p:sp>
+        <p:nvSpPr>
+          <p:cNvPr id="2" name="슬라이드 이미지 개체 틀 1"/>
+          <p:cNvSpPr>
+            <a:spLocks noGrp="1" noRot="1" noChangeAspect="1"/>
+          </p:cNvSpPr>
+          <p:nvPr>
+            <p:ph type="sldImg"/>
+          </p:nvPr>
+        </p:nvSpPr>
+        <p:spPr/>
+      </p:sp>
+      <p:sp>
+        <p:nvSpPr>
+          <p:cNvPr id="3" name="슬라이드 노트 개체 틀 2"/>
+          <p:cNvSpPr>
+            <a:spLocks noGrp="1"/>
+          </p:cNvSpPr>
+          <p:nvPr>
+            <p:ph type="body" idx="1"/>
+          </p:nvPr>
+        </p:nvSpPr>
+        <p:spPr/>
+        <p:txBody>
+          <a:bodyPr rtlCol="0"/>
+          <a:lstStyle/>
+          <a:p>
+            <a:pPr rtl="0"/>
+            <a:r>
+              <a:rPr lang="ko-KR" altLang="en-US" smtClean="0">
+                <a:latin typeface="맑은 고딕" panose="020B0503020000020004" pitchFamily="50" charset="-127"/>
+                <a:ea typeface="맑은 고딕" panose="020B0503020000020004" pitchFamily="50" charset="-127"/>
+              </a:rPr>
+              <a:t>뷰포트 행렬은 정점을 정규화된 장치 좌표에서 화면 공간으로 변환한다</a:t>
+            </a:r>
+            <a:r>
+              <a:rPr lang="en-US" altLang="ko-KR" smtClean="0">
+                <a:latin typeface="맑은 고딕" panose="020B0503020000020004" pitchFamily="50" charset="-127"/>
+                <a:ea typeface="맑은 고딕" panose="020B0503020000020004" pitchFamily="50" charset="-127"/>
+              </a:rPr>
+              <a:t>.</a:t>
+            </a:r>
+          </a:p>
+          <a:p>
+            <a:pPr rtl="0"/>
+            <a:endParaRPr lang="en-US" altLang="ko-KR" smtClean="0">
+              <a:latin typeface="맑은 고딕" panose="020B0503020000020004" pitchFamily="50" charset="-127"/>
+              <a:ea typeface="맑은 고딕" panose="020B0503020000020004" pitchFamily="50" charset="-127"/>
+            </a:endParaRPr>
+          </a:p>
+          <a:p>
+            <a:pPr rtl="0"/>
+            <a:r>
+              <a:rPr lang="ko-KR" altLang="en-US" smtClean="0">
+                <a:latin typeface="맑은 고딕" panose="020B0503020000020004" pitchFamily="50" charset="-127"/>
+                <a:ea typeface="맑은 고딕" panose="020B0503020000020004" pitchFamily="50" charset="-127"/>
+              </a:rPr>
+              <a:t>이 뷰포트 행렬에 나오는 변수들은 </a:t>
+            </a:r>
+            <a:r>
+              <a:rPr lang="en-US" altLang="ko-KR" smtClean="0">
+                <a:latin typeface="맑은 고딕" panose="020B0503020000020004" pitchFamily="50" charset="-127"/>
+                <a:ea typeface="맑은 고딕" panose="020B0503020000020004" pitchFamily="50" charset="-127"/>
+              </a:rPr>
+              <a:t>D3D12_VIEWPORT</a:t>
+            </a:r>
+            <a:r>
+              <a:rPr lang="ko-KR" altLang="en-US" smtClean="0">
+                <a:latin typeface="맑은 고딕" panose="020B0503020000020004" pitchFamily="50" charset="-127"/>
+                <a:ea typeface="맑은 고딕" panose="020B0503020000020004" pitchFamily="50" charset="-127"/>
+              </a:rPr>
+              <a:t>구조체의 멤버들에 대응된다</a:t>
+            </a:r>
+            <a:r>
+              <a:rPr lang="en-US" altLang="ko-KR" smtClean="0">
+                <a:latin typeface="맑은 고딕" panose="020B0503020000020004" pitchFamily="50" charset="-127"/>
+                <a:ea typeface="맑은 고딕" panose="020B0503020000020004" pitchFamily="50" charset="-127"/>
+              </a:rPr>
+              <a:t>.</a:t>
+            </a:r>
+          </a:p>
+        </p:txBody>
+      </p:sp>
+      <p:sp>
+        <p:nvSpPr>
+          <p:cNvPr id="4" name="슬라이드 번호 개체 틀 3"/>
+          <p:cNvSpPr>
+            <a:spLocks noGrp="1"/>
+          </p:cNvSpPr>
+          <p:nvPr>
+            <p:ph type="sldNum" sz="quarter" idx="10"/>
+          </p:nvPr>
+        </p:nvSpPr>
+        <p:spPr/>
+        <p:txBody>
+          <a:bodyPr rtlCol="0"/>
+          <a:lstStyle/>
+          <a:p>
+            <a:pPr rtl="0"/>
+            <a:fld id="{82869989-EB00-4EE7-BCB5-25BDC5BB29F8}" type="slidenum">
+              <a:rPr lang="en-US" altLang="ko-KR" smtClean="0">
+                <a:latin typeface="맑은 고딕" panose="020B0503020000020004" pitchFamily="50" charset="-127"/>
+                <a:ea typeface="맑은 고딕" panose="020B0503020000020004" pitchFamily="50" charset="-127"/>
+              </a:rPr>
+              <a:t>5</a:t>
+            </a:fld>
+            <a:endParaRPr lang="ko-KR" altLang="en-US" dirty="0">
+              <a:latin typeface="맑은 고딕" panose="020B0503020000020004" pitchFamily="50" charset="-127"/>
+              <a:ea typeface="맑은 고딕" panose="020B0503020000020004" pitchFamily="50" charset="-127"/>
+            </a:endParaRPr>
+          </a:p>
+        </p:txBody>
+      </p:sp>
+    </p:spTree>
+    <p:extLst>
+      <p:ext uri="{BB962C8B-B14F-4D97-AF65-F5344CB8AC3E}">
+        <p14:creationId xmlns:p14="http://schemas.microsoft.com/office/powerpoint/2010/main" val="1826033276"/>
+      </p:ext>
+    </p:extLst>
+  </p:cSld>
+  <p:clrMapOvr>
+    <a:masterClrMapping/>
+  </p:clrMapOvr>
+</p:notes>
+</file>
+
+<file path=ppt/notesSlides/notesSlide6.xml><?xml version="1.0" encoding="utf-8"?>
+<p:notes xmlns:a="http://schemas.openxmlformats.org/drawingml/2006/main" xmlns:r="http://schemas.openxmlformats.org/officeDocument/2006/relationships" xmlns:p="http://schemas.openxmlformats.org/presentationml/2006/main">
+  <p:cSld>
+    <p:spTree>
+      <p:nvGrpSpPr>
+        <p:cNvPr id="1" name=""/>
+        <p:cNvGrpSpPr/>
+        <p:nvPr/>
+      </p:nvGrpSpPr>
+      <p:grpSpPr>
+        <a:xfrm>
+          <a:off x="0" y="0"/>
+          <a:ext cx="0" cy="0"/>
+          <a:chOff x="0" y="0"/>
+          <a:chExt cx="0" cy="0"/>
+        </a:xfrm>
+      </p:grpSpPr>
+      <p:sp>
+        <p:nvSpPr>
+          <p:cNvPr id="2" name="슬라이드 이미지 개체 틀 1"/>
+          <p:cNvSpPr>
+            <a:spLocks noGrp="1" noRot="1" noChangeAspect="1"/>
+          </p:cNvSpPr>
+          <p:nvPr>
+            <p:ph type="sldImg"/>
+          </p:nvPr>
+        </p:nvSpPr>
+        <p:spPr/>
+      </p:sp>
+      <p:sp>
+        <p:nvSpPr>
+          <p:cNvPr id="3" name="슬라이드 노트 개체 틀 2"/>
+          <p:cNvSpPr>
+            <a:spLocks noGrp="1"/>
+          </p:cNvSpPr>
+          <p:nvPr>
+            <p:ph type="body" idx="1"/>
+          </p:nvPr>
+        </p:nvSpPr>
+        <p:spPr/>
+        <p:txBody>
+          <a:bodyPr rtlCol="0"/>
+          <a:lstStyle/>
+          <a:p>
+            <a:pPr rtl="0"/>
+            <a:endParaRPr lang="en-US" altLang="ko-KR" smtClean="0">
+              <a:latin typeface="맑은 고딕" panose="020B0503020000020004" pitchFamily="50" charset="-127"/>
+              <a:ea typeface="맑은 고딕" panose="020B0503020000020004" pitchFamily="50" charset="-127"/>
+            </a:endParaRPr>
+          </a:p>
+        </p:txBody>
+      </p:sp>
+      <p:sp>
+        <p:nvSpPr>
+          <p:cNvPr id="4" name="슬라이드 번호 개체 틀 3"/>
+          <p:cNvSpPr>
+            <a:spLocks noGrp="1"/>
+          </p:cNvSpPr>
+          <p:nvPr>
+            <p:ph type="sldNum" sz="quarter" idx="10"/>
+          </p:nvPr>
+        </p:nvSpPr>
+        <p:spPr/>
+        <p:txBody>
+          <a:bodyPr rtlCol="0"/>
+          <a:lstStyle/>
+          <a:p>
+            <a:pPr rtl="0"/>
+            <a:fld id="{82869989-EB00-4EE7-BCB5-25BDC5BB29F8}" type="slidenum">
+              <a:rPr lang="en-US" altLang="ko-KR" smtClean="0">
+                <a:latin typeface="맑은 고딕" panose="020B0503020000020004" pitchFamily="50" charset="-127"/>
+                <a:ea typeface="맑은 고딕" panose="020B0503020000020004" pitchFamily="50" charset="-127"/>
+              </a:rPr>
+              <a:t>6</a:t>
+            </a:fld>
+            <a:endParaRPr lang="ko-KR" altLang="en-US" dirty="0">
+              <a:latin typeface="맑은 고딕" panose="020B0503020000020004" pitchFamily="50" charset="-127"/>
+              <a:ea typeface="맑은 고딕" panose="020B0503020000020004" pitchFamily="50" charset="-127"/>
+            </a:endParaRPr>
+          </a:p>
+        </p:txBody>
+      </p:sp>
+    </p:spTree>
+    <p:extLst>
+      <p:ext uri="{BB962C8B-B14F-4D97-AF65-F5344CB8AC3E}">
+        <p14:creationId xmlns:p14="http://schemas.microsoft.com/office/powerpoint/2010/main" val="3503702183"/>
+      </p:ext>
+    </p:extLst>
+  </p:cSld>
+  <p:clrMapOvr>
+    <a:masterClrMapping/>
+  </p:clrMapOvr>
+</p:notes>
+</file>
+
 <file path=ppt/slideLayouts/slideLayout1.xml><?xml version="1.0" encoding="utf-8"?>
 <p:sldLayout xmlns:a="http://schemas.openxmlformats.org/drawingml/2006/main" xmlns:r="http://schemas.openxmlformats.org/officeDocument/2006/relationships" xmlns:p="http://schemas.openxmlformats.org/presentationml/2006/main" showMasterSp="0" type="title" preserve="1">
   <p:cSld name="제목 슬라이드">
@@ -3638,7 +3878,7 @@
           <a:p>
             <a:fld id="{2A5B65E4-62A8-4988-B07B-5D6D443B14ED}" type="datetime4">
               <a:rPr lang="ko-KR" altLang="en-US" smtClean="0"/>
-              <a:t>2019년 7월 15일</a:t>
+              <a:t>2019년 7월 16일</a:t>
             </a:fld>
             <a:endParaRPr lang="ko-KR" altLang="en-US" dirty="0"/>
           </a:p>
@@ -3894,7 +4134,7 @@
           <a:p>
             <a:fld id="{58EB6286-0DE7-4336-9826-977AD102FCF2}" type="datetime4">
               <a:rPr lang="ko-KR" altLang="en-US" noProof="0" smtClean="0"/>
-              <a:t>2019년 7월 15일</a:t>
+              <a:t>2019년 7월 16일</a:t>
             </a:fld>
             <a:endParaRPr lang="ko-KR" altLang="en-US" noProof="0" dirty="0"/>
           </a:p>
@@ -4090,7 +4330,7 @@
             <a:pPr rtl="0"/>
             <a:fld id="{6A5419DA-7218-42E5-A443-F000500111E1}" type="datetime4">
               <a:rPr lang="ko-KR" altLang="en-US" noProof="0" smtClean="0"/>
-              <a:t>2019년 7월 15일</a:t>
+              <a:t>2019년 7월 16일</a:t>
             </a:fld>
             <a:endParaRPr lang="ko-KR" altLang="en-US" noProof="0" dirty="0"/>
           </a:p>
@@ -6491,7 +6731,7 @@
           <a:p>
             <a:fld id="{E498C52F-1DF1-4226-BAB6-C1E2EE4C9D62}" type="datetime4">
               <a:rPr lang="ko-KR" altLang="en-US" noProof="0" smtClean="0"/>
-              <a:t>2019년 7월 15일</a:t>
+              <a:t>2019년 7월 16일</a:t>
             </a:fld>
             <a:endParaRPr lang="ko-KR" altLang="en-US" noProof="0" dirty="0"/>
           </a:p>
@@ -7010,7 +7250,7 @@
           <a:p>
             <a:fld id="{7B1E1FFC-F755-4558-8D3C-A157D1A01A8A}" type="datetime4">
               <a:rPr lang="ko-KR" altLang="en-US" noProof="0" smtClean="0"/>
-              <a:t>2019년 7월 15일</a:t>
+              <a:t>2019년 7월 16일</a:t>
             </a:fld>
             <a:endParaRPr lang="ko-KR" altLang="en-US" noProof="0" dirty="0"/>
           </a:p>
@@ -7154,7 +7394,7 @@
             <a:pPr rtl="0"/>
             <a:fld id="{DA2A33C0-A4A8-4C90-B6DA-35B8CF58C816}" type="datetime4">
               <a:rPr lang="ko-KR" altLang="en-US" noProof="0" smtClean="0"/>
-              <a:t>2019년 7월 15일</a:t>
+              <a:t>2019년 7월 16일</a:t>
             </a:fld>
             <a:endParaRPr lang="ko-KR" altLang="en-US" noProof="0" dirty="0"/>
           </a:p>
@@ -9102,7 +9342,7 @@
           <a:p>
             <a:fld id="{53CB1B8F-A14A-4BE4-A9B9-3B263F04145C}" type="datetime4">
               <a:rPr lang="ko-KR" altLang="en-US" noProof="0" smtClean="0"/>
-              <a:t>2019년 7월 15일</a:t>
+              <a:t>2019년 7월 16일</a:t>
             </a:fld>
             <a:endParaRPr lang="ko-KR" altLang="en-US" noProof="0" dirty="0"/>
           </a:p>
@@ -11399,7 +11639,7 @@
           <a:p>
             <a:fld id="{5B9196A3-957C-4113-A568-B6ED9AEA3D01}" type="datetime4">
               <a:rPr lang="ko-KR" altLang="en-US" noProof="0" smtClean="0"/>
-              <a:t>2019년 7월 15일</a:t>
+              <a:t>2019년 7월 16일</a:t>
             </a:fld>
             <a:endParaRPr lang="ko-KR" altLang="en-US" noProof="0" dirty="0"/>
           </a:p>
@@ -15716,7 +15956,7 @@
           <a:p>
             <a:fld id="{28BEB146-D335-4DA5-9826-58595BCDBE2E}" type="datetime4">
               <a:rPr lang="ko-KR" altLang="en-US" noProof="0" smtClean="0"/>
-              <a:t>2019년 7월 15일</a:t>
+              <a:t>2019년 7월 16일</a:t>
             </a:fld>
             <a:endParaRPr lang="ko-KR" altLang="en-US" noProof="0" dirty="0"/>
           </a:p>
@@ -16528,7 +16768,7 @@
           <a:p>
             <a:r>
               <a:rPr lang="en-US" altLang="ko-KR" smtClean="0"/>
-              <a:t>3</a:t>
+              <a:t>1. 3</a:t>
             </a:r>
             <a:r>
               <a:rPr lang="ko-KR" altLang="en-US" smtClean="0"/>
@@ -16536,11 +16776,7 @@
             </a:r>
             <a:r>
               <a:rPr lang="en-US" altLang="ko-KR" smtClean="0"/>
-              <a:t>(</a:t>
-            </a:r>
-            <a:r>
-              <a:rPr lang="en-US" altLang="ko-KR" smtClean="0"/>
-              <a:t>Picking)</a:t>
+              <a:t>(Picking)</a:t>
             </a:r>
             <a:endParaRPr lang="ko-KR" altLang="en-US" dirty="0"/>
           </a:p>
@@ -17027,7 +17263,7 @@
             <p:cNvPr id="7" name="TextBox 6">
               <a:extLst>
                 <a:ext uri="{FF2B5EF4-FFF2-40B4-BE49-F238E27FC236}">
-                  <a16:creationId xmlns="" xmlns:a16="http://schemas.microsoft.com/office/drawing/2014/main" id="{69F81465-6DFE-4098-8458-39E005A83CA5}"/>
+                  <a16:creationId xmlns:a16="http://schemas.microsoft.com/office/drawing/2014/main" xmlns="" id="{69F81465-6DFE-4098-8458-39E005A83CA5}"/>
                 </a:ext>
               </a:extLst>
             </p:cNvPr>
@@ -17068,11 +17304,7 @@
               </a:r>
               <a:r>
                 <a:rPr lang="ko-KR" altLang="en-US" sz="1500" smtClean="0"/>
-                <a:t>십이면체 </a:t>
-              </a:r>
-              <a:r>
-                <a:rPr lang="ko-KR" altLang="en-US" sz="1500" smtClean="0"/>
-                <a:t>선택</a:t>
+                <a:t>십이면체 선택</a:t>
               </a:r>
               <a:r>
                 <a:rPr lang="en-US" altLang="ko-KR" sz="1400" smtClean="0"/>
@@ -17159,16 +17391,12 @@
           <a:lstStyle/>
           <a:p>
             <a:r>
-              <a:rPr lang="en-US" altLang="ko-KR"/>
-              <a:t>3</a:t>
+              <a:rPr lang="en-US" altLang="ko-KR" smtClean="0"/>
+              <a:t>2. 3</a:t>
             </a:r>
             <a:r>
               <a:rPr lang="ko-KR" altLang="en-US"/>
-              <a:t>차원 물체 </a:t>
-            </a:r>
-            <a:r>
-              <a:rPr lang="ko-KR" altLang="en-US"/>
-              <a:t>선택</a:t>
+              <a:t>차원 물체 선택</a:t>
             </a:r>
             <a:r>
               <a:rPr lang="en-US" altLang="ko-KR" smtClean="0"/>
@@ -17231,7 +17459,7 @@
             <p:cNvPr id="12" name="TextBox 11">
               <a:extLst>
                 <a:ext uri="{FF2B5EF4-FFF2-40B4-BE49-F238E27FC236}">
-                  <a16:creationId xmlns="" xmlns:a16="http://schemas.microsoft.com/office/drawing/2014/main" id="{69F81465-6DFE-4098-8458-39E005A83CA5}"/>
+                  <a16:creationId xmlns:a16="http://schemas.microsoft.com/office/drawing/2014/main" xmlns="" id="{69F81465-6DFE-4098-8458-39E005A83CA5}"/>
                 </a:ext>
               </a:extLst>
             </p:cNvPr>
@@ -17351,7 +17579,7 @@
             <p:cNvPr id="13" name="TextBox 12">
               <a:extLst>
                 <a:ext uri="{FF2B5EF4-FFF2-40B4-BE49-F238E27FC236}">
-                  <a16:creationId xmlns="" xmlns:a16="http://schemas.microsoft.com/office/drawing/2014/main" id="{69F81465-6DFE-4098-8458-39E005A83CA5}"/>
+                  <a16:creationId xmlns:a16="http://schemas.microsoft.com/office/drawing/2014/main" xmlns="" id="{69F81465-6DFE-4098-8458-39E005A83CA5}"/>
                 </a:ext>
               </a:extLst>
             </p:cNvPr>
@@ -17454,6 +17682,566 @@
     <p:extLst>
       <p:ext uri="{BB962C8B-B14F-4D97-AF65-F5344CB8AC3E}">
         <p14:creationId xmlns:p14="http://schemas.microsoft.com/office/powerpoint/2010/main" val="354460782"/>
+      </p:ext>
+    </p:extLst>
+  </p:cSld>
+  <p:clrMapOvr>
+    <a:masterClrMapping/>
+  </p:clrMapOvr>
+  <mc:AlternateContent xmlns:mc="http://schemas.openxmlformats.org/markup-compatibility/2006" xmlns:p14="http://schemas.microsoft.com/office/powerpoint/2010/main">
+    <mc:Choice Requires="p14">
+      <p:transition spd="med" p14:dur="700">
+        <p:fade/>
+      </p:transition>
+    </mc:Choice>
+    <mc:Fallback xmlns="">
+      <p:transition spd="med">
+        <p:fade/>
+      </p:transition>
+    </mc:Fallback>
+  </mc:AlternateContent>
+  <p:timing>
+    <p:tnLst>
+      <p:par>
+        <p:cTn id="1" dur="indefinite" restart="never" nodeType="tmRoot"/>
+      </p:par>
+    </p:tnLst>
+  </p:timing>
+</p:sld>
+</file>
+
+<file path=ppt/slides/slide5.xml><?xml version="1.0" encoding="utf-8"?>
+<p:sld xmlns:a="http://schemas.openxmlformats.org/drawingml/2006/main" xmlns:r="http://schemas.openxmlformats.org/officeDocument/2006/relationships" xmlns:p="http://schemas.openxmlformats.org/presentationml/2006/main">
+  <p:cSld>
+    <p:spTree>
+      <p:nvGrpSpPr>
+        <p:cNvPr id="1" name=""/>
+        <p:cNvGrpSpPr/>
+        <p:nvPr/>
+      </p:nvGrpSpPr>
+      <p:grpSpPr>
+        <a:xfrm>
+          <a:off x="0" y="0"/>
+          <a:ext cx="0" cy="0"/>
+          <a:chOff x="0" y="0"/>
+          <a:chExt cx="0" cy="0"/>
+        </a:xfrm>
+      </p:grpSpPr>
+      <p:sp>
+        <p:nvSpPr>
+          <p:cNvPr id="2" name="제목 1"/>
+          <p:cNvSpPr>
+            <a:spLocks noGrp="1"/>
+          </p:cNvSpPr>
+          <p:nvPr>
+            <p:ph type="title"/>
+          </p:nvPr>
+        </p:nvSpPr>
+        <p:spPr>
+          <a:xfrm>
+            <a:off x="1295400" y="503854"/>
+            <a:ext cx="9601200" cy="587192"/>
+          </a:xfrm>
+        </p:spPr>
+        <p:txBody>
+          <a:bodyPr rtlCol="0">
+            <a:normAutofit/>
+          </a:bodyPr>
+          <a:lstStyle/>
+          <a:p>
+            <a:r>
+              <a:rPr lang="en-US" altLang="ko-KR" smtClean="0"/>
+              <a:t>3. </a:t>
+            </a:r>
+            <a:r>
+              <a:rPr lang="ko-KR" altLang="en-US" smtClean="0"/>
+              <a:t>화면에서 투영 창으로의 변환</a:t>
+            </a:r>
+            <a:endParaRPr lang="ko-KR" altLang="en-US" sz="2400" dirty="0"/>
+          </a:p>
+        </p:txBody>
+      </p:sp>
+      <p:grpSp>
+        <p:nvGrpSpPr>
+          <p:cNvPr id="5" name="그룹 4"/>
+          <p:cNvGrpSpPr/>
+          <p:nvPr/>
+        </p:nvGrpSpPr>
+        <p:grpSpPr>
+          <a:xfrm>
+            <a:off x="3416135" y="1230793"/>
+            <a:ext cx="5359730" cy="1885196"/>
+            <a:chOff x="3416134" y="1242668"/>
+            <a:chExt cx="5359730" cy="1885196"/>
+          </a:xfrm>
+        </p:grpSpPr>
+        <p:pic>
+          <p:nvPicPr>
+            <p:cNvPr id="4" name="그림 3"/>
+            <p:cNvPicPr>
+              <a:picLocks noChangeAspect="1"/>
+            </p:cNvPicPr>
+            <p:nvPr/>
+          </p:nvPicPr>
+          <p:blipFill>
+            <a:blip r:embed="rId3"/>
+            <a:stretch>
+              <a:fillRect/>
+            </a:stretch>
+          </p:blipFill>
+          <p:spPr>
+            <a:xfrm>
+              <a:off x="3416134" y="1242668"/>
+              <a:ext cx="5359730" cy="1723614"/>
+            </a:xfrm>
+            <a:prstGeom prst="rect">
+              <a:avLst/>
+            </a:prstGeom>
+          </p:spPr>
+        </p:pic>
+        <p:sp>
+          <p:nvSpPr>
+            <p:cNvPr id="11" name="TextBox 10">
+              <a:extLst>
+                <a:ext uri="{FF2B5EF4-FFF2-40B4-BE49-F238E27FC236}">
+                  <a16:creationId xmlns:a16="http://schemas.microsoft.com/office/drawing/2014/main" xmlns="" id="{69F81465-6DFE-4098-8458-39E005A83CA5}"/>
+                </a:ext>
+              </a:extLst>
+            </p:cNvPr>
+            <p:cNvSpPr txBox="1"/>
+            <p:nvPr/>
+          </p:nvSpPr>
+          <p:spPr>
+            <a:xfrm>
+              <a:off x="5240299" y="2804699"/>
+              <a:ext cx="2423918" cy="323165"/>
+            </a:xfrm>
+            <a:prstGeom prst="rect">
+              <a:avLst/>
+            </a:prstGeom>
+            <a:noFill/>
+            <a:ln>
+              <a:noFill/>
+            </a:ln>
+          </p:spPr>
+          <p:txBody>
+            <a:bodyPr wrap="square" rtlCol="0">
+              <a:spAutoFit/>
+            </a:bodyPr>
+            <a:lstStyle/>
+            <a:p>
+              <a:pPr algn="ctr"/>
+              <a:r>
+                <a:rPr lang="ko-KR" altLang="en-US" sz="1500" smtClean="0"/>
+                <a:t>그림 </a:t>
+              </a:r>
+              <a:r>
+                <a:rPr lang="en-US" altLang="ko-KR" sz="1500" dirty="0"/>
+                <a:t>4</a:t>
+              </a:r>
+              <a:r>
+                <a:rPr lang="en-US" altLang="ko-KR" sz="1500" smtClean="0"/>
+                <a:t>. </a:t>
+              </a:r>
+              <a:r>
+                <a:rPr lang="ko-KR" altLang="en-US" sz="1500" smtClean="0"/>
+                <a:t>뷰포트 행렬</a:t>
+              </a:r>
+              <a:endParaRPr lang="en-US" altLang="ko-KR" sz="1400" dirty="0"/>
+            </a:p>
+          </p:txBody>
+        </p:sp>
+      </p:grpSp>
+      <p:pic>
+        <p:nvPicPr>
+          <p:cNvPr id="8" name="그림 7"/>
+          <p:cNvPicPr>
+            <a:picLocks noChangeAspect="1"/>
+          </p:cNvPicPr>
+          <p:nvPr/>
+        </p:nvPicPr>
+        <p:blipFill>
+          <a:blip r:embed="rId4"/>
+          <a:stretch>
+            <a:fillRect/>
+          </a:stretch>
+        </p:blipFill>
+        <p:spPr>
+          <a:xfrm>
+            <a:off x="1832082" y="3874708"/>
+            <a:ext cx="2423918" cy="1939134"/>
+          </a:xfrm>
+          <a:prstGeom prst="rect">
+            <a:avLst/>
+          </a:prstGeom>
+        </p:spPr>
+      </p:pic>
+      <p:pic>
+        <p:nvPicPr>
+          <p:cNvPr id="9" name="그림 8"/>
+          <p:cNvPicPr>
+            <a:picLocks noChangeAspect="1"/>
+          </p:cNvPicPr>
+          <p:nvPr/>
+        </p:nvPicPr>
+        <p:blipFill>
+          <a:blip r:embed="rId5"/>
+          <a:stretch>
+            <a:fillRect/>
+          </a:stretch>
+        </p:blipFill>
+        <p:spPr>
+          <a:xfrm>
+            <a:off x="5043238" y="4096987"/>
+            <a:ext cx="6546894" cy="1494576"/>
+          </a:xfrm>
+          <a:prstGeom prst="rect">
+            <a:avLst/>
+          </a:prstGeom>
+        </p:spPr>
+      </p:pic>
+      <p:sp>
+        <p:nvSpPr>
+          <p:cNvPr id="15" name="TextBox 14">
+            <a:extLst>
+              <a:ext uri="{FF2B5EF4-FFF2-40B4-BE49-F238E27FC236}">
+                <a16:creationId xmlns:a16="http://schemas.microsoft.com/office/drawing/2014/main" xmlns="" id="{69F81465-6DFE-4098-8458-39E005A83CA5}"/>
+              </a:ext>
+            </a:extLst>
+          </p:cNvPr>
+          <p:cNvSpPr txBox="1"/>
+          <p:nvPr/>
+        </p:nvSpPr>
+        <p:spPr>
+          <a:xfrm>
+            <a:off x="1438463" y="5808775"/>
+            <a:ext cx="3211156" cy="323165"/>
+          </a:xfrm>
+          <a:prstGeom prst="rect">
+            <a:avLst/>
+          </a:prstGeom>
+          <a:noFill/>
+          <a:ln>
+            <a:noFill/>
+          </a:ln>
+        </p:spPr>
+        <p:txBody>
+          <a:bodyPr wrap="square" rtlCol="0">
+            <a:spAutoFit/>
+          </a:bodyPr>
+          <a:lstStyle/>
+          <a:p>
+            <a:pPr algn="ctr"/>
+            <a:r>
+              <a:rPr lang="ko-KR" altLang="en-US" sz="1500" smtClean="0"/>
+              <a:t>그림 </a:t>
+            </a:r>
+            <a:r>
+              <a:rPr lang="en-US" altLang="ko-KR" sz="1500" dirty="0"/>
+              <a:t>5</a:t>
+            </a:r>
+            <a:r>
+              <a:rPr lang="en-US" altLang="ko-KR" sz="1500" smtClean="0"/>
+              <a:t>. D3D12_VIEWPORT</a:t>
+            </a:r>
+            <a:r>
+              <a:rPr lang="ko-KR" altLang="en-US" sz="1500" smtClean="0"/>
+              <a:t>구조체</a:t>
+            </a:r>
+            <a:endParaRPr lang="en-US" altLang="ko-KR" sz="1400" dirty="0"/>
+          </a:p>
+        </p:txBody>
+      </p:sp>
+    </p:spTree>
+    <p:extLst>
+      <p:ext uri="{BB962C8B-B14F-4D97-AF65-F5344CB8AC3E}">
+        <p14:creationId xmlns:p14="http://schemas.microsoft.com/office/powerpoint/2010/main" val="627450634"/>
+      </p:ext>
+    </p:extLst>
+  </p:cSld>
+  <p:clrMapOvr>
+    <a:masterClrMapping/>
+  </p:clrMapOvr>
+  <mc:AlternateContent xmlns:mc="http://schemas.openxmlformats.org/markup-compatibility/2006" xmlns:p14="http://schemas.microsoft.com/office/powerpoint/2010/main">
+    <mc:Choice Requires="p14">
+      <p:transition spd="med" p14:dur="700">
+        <p:fade/>
+      </p:transition>
+    </mc:Choice>
+    <mc:Fallback xmlns="">
+      <p:transition spd="med">
+        <p:fade/>
+      </p:transition>
+    </mc:Fallback>
+  </mc:AlternateContent>
+  <p:timing>
+    <p:tnLst>
+      <p:par>
+        <p:cTn id="1" dur="indefinite" restart="never" nodeType="tmRoot"/>
+      </p:par>
+    </p:tnLst>
+  </p:timing>
+</p:sld>
+</file>
+
+<file path=ppt/slides/slide6.xml><?xml version="1.0" encoding="utf-8"?>
+<p:sld xmlns:a="http://schemas.openxmlformats.org/drawingml/2006/main" xmlns:r="http://schemas.openxmlformats.org/officeDocument/2006/relationships" xmlns:p="http://schemas.openxmlformats.org/presentationml/2006/main">
+  <p:cSld>
+    <p:spTree>
+      <p:nvGrpSpPr>
+        <p:cNvPr id="1" name=""/>
+        <p:cNvGrpSpPr/>
+        <p:nvPr/>
+      </p:nvGrpSpPr>
+      <p:grpSpPr>
+        <a:xfrm>
+          <a:off x="0" y="0"/>
+          <a:ext cx="0" cy="0"/>
+          <a:chOff x="0" y="0"/>
+          <a:chExt cx="0" cy="0"/>
+        </a:xfrm>
+      </p:grpSpPr>
+      <p:sp>
+        <p:nvSpPr>
+          <p:cNvPr id="2" name="제목 1"/>
+          <p:cNvSpPr>
+            <a:spLocks noGrp="1"/>
+          </p:cNvSpPr>
+          <p:nvPr>
+            <p:ph type="title"/>
+          </p:nvPr>
+        </p:nvSpPr>
+        <p:spPr>
+          <a:xfrm>
+            <a:off x="1295400" y="503854"/>
+            <a:ext cx="9601200" cy="587192"/>
+          </a:xfrm>
+        </p:spPr>
+        <p:txBody>
+          <a:bodyPr rtlCol="0">
+            <a:normAutofit/>
+          </a:bodyPr>
+          <a:lstStyle/>
+          <a:p>
+            <a:r>
+              <a:rPr lang="en-US" altLang="ko-KR" smtClean="0"/>
+              <a:t>3. </a:t>
+            </a:r>
+            <a:r>
+              <a:rPr lang="ko-KR" altLang="en-US" smtClean="0"/>
+              <a:t>화면에서 투영 창으로의 변환</a:t>
+            </a:r>
+            <a:endParaRPr lang="ko-KR" altLang="en-US" sz="2400" dirty="0"/>
+          </a:p>
+        </p:txBody>
+      </p:sp>
+      <p:pic>
+        <p:nvPicPr>
+          <p:cNvPr id="6" name="그림 5"/>
+          <p:cNvPicPr>
+            <a:picLocks noChangeAspect="1"/>
+          </p:cNvPicPr>
+          <p:nvPr/>
+        </p:nvPicPr>
+        <p:blipFill>
+          <a:blip r:embed="rId3">
+            <a:extLst>
+              <a:ext uri="{28A0092B-C50C-407E-A947-70E740481C1C}">
+                <a14:useLocalDpi xmlns:a14="http://schemas.microsoft.com/office/drawing/2010/main" val="0"/>
+              </a:ext>
+            </a:extLst>
+          </a:blip>
+          <a:stretch>
+            <a:fillRect/>
+          </a:stretch>
+        </p:blipFill>
+        <p:spPr>
+          <a:xfrm>
+            <a:off x="8506553" y="1137500"/>
+            <a:ext cx="3005423" cy="2937600"/>
+          </a:xfrm>
+          <a:prstGeom prst="rect">
+            <a:avLst/>
+          </a:prstGeom>
+        </p:spPr>
+      </p:pic>
+      <p:grpSp>
+        <p:nvGrpSpPr>
+          <p:cNvPr id="7" name="그룹 6"/>
+          <p:cNvGrpSpPr/>
+          <p:nvPr/>
+        </p:nvGrpSpPr>
+        <p:grpSpPr>
+          <a:xfrm>
+            <a:off x="625449" y="1137500"/>
+            <a:ext cx="5834712" cy="3260765"/>
+            <a:chOff x="625449" y="1460665"/>
+            <a:chExt cx="5834712" cy="3260765"/>
+          </a:xfrm>
+        </p:grpSpPr>
+        <p:pic>
+          <p:nvPicPr>
+            <p:cNvPr id="3" name="그림 2"/>
+            <p:cNvPicPr>
+              <a:picLocks noChangeAspect="1"/>
+            </p:cNvPicPr>
+            <p:nvPr/>
+          </p:nvPicPr>
+          <p:blipFill>
+            <a:blip r:embed="rId4">
+              <a:extLst>
+                <a:ext uri="{28A0092B-C50C-407E-A947-70E740481C1C}">
+                  <a14:useLocalDpi xmlns:a14="http://schemas.microsoft.com/office/drawing/2010/main" val="0"/>
+                </a:ext>
+              </a:extLst>
+            </a:blip>
+            <a:stretch>
+              <a:fillRect/>
+            </a:stretch>
+          </p:blipFill>
+          <p:spPr>
+            <a:xfrm>
+              <a:off x="625449" y="1460665"/>
+              <a:ext cx="5834712" cy="2939142"/>
+            </a:xfrm>
+            <a:prstGeom prst="rect">
+              <a:avLst/>
+            </a:prstGeom>
+          </p:spPr>
+        </p:pic>
+        <p:sp>
+          <p:nvSpPr>
+            <p:cNvPr id="12" name="TextBox 11">
+              <a:extLst>
+                <a:ext uri="{FF2B5EF4-FFF2-40B4-BE49-F238E27FC236}">
+                  <a16:creationId xmlns:a16="http://schemas.microsoft.com/office/drawing/2014/main" xmlns="" id="{69F81465-6DFE-4098-8458-39E005A83CA5}"/>
+                </a:ext>
+              </a:extLst>
+            </p:cNvPr>
+            <p:cNvSpPr txBox="1"/>
+            <p:nvPr/>
+          </p:nvSpPr>
+          <p:spPr>
+            <a:xfrm>
+              <a:off x="1937227" y="4398265"/>
+              <a:ext cx="3211156" cy="323165"/>
+            </a:xfrm>
+            <a:prstGeom prst="rect">
+              <a:avLst/>
+            </a:prstGeom>
+            <a:noFill/>
+            <a:ln>
+              <a:noFill/>
+            </a:ln>
+          </p:spPr>
+          <p:txBody>
+            <a:bodyPr wrap="square" rtlCol="0">
+              <a:spAutoFit/>
+            </a:bodyPr>
+            <a:lstStyle/>
+            <a:p>
+              <a:pPr algn="ctr"/>
+              <a:r>
+                <a:rPr lang="ko-KR" altLang="en-US" sz="1500" smtClean="0"/>
+                <a:t>그림 </a:t>
+              </a:r>
+              <a:r>
+                <a:rPr lang="en-US" altLang="ko-KR" sz="1500" dirty="0"/>
+                <a:t>6</a:t>
+              </a:r>
+              <a:r>
+                <a:rPr lang="en-US" altLang="ko-KR" sz="1500" smtClean="0"/>
+                <a:t>. </a:t>
+              </a:r>
+              <a:r>
+                <a:rPr lang="ko-KR" altLang="en-US" sz="1500" smtClean="0"/>
+                <a:t>닮은꼴 삼각형 성질</a:t>
+              </a:r>
+              <a:endParaRPr lang="en-US" altLang="ko-KR" sz="1400" dirty="0"/>
+            </a:p>
+          </p:txBody>
+        </p:sp>
+      </p:grpSp>
+      <p:pic>
+        <p:nvPicPr>
+          <p:cNvPr id="10" name="그림 9"/>
+          <p:cNvPicPr>
+            <a:picLocks noChangeAspect="1"/>
+          </p:cNvPicPr>
+          <p:nvPr/>
+        </p:nvPicPr>
+        <p:blipFill>
+          <a:blip r:embed="rId5"/>
+          <a:stretch>
+            <a:fillRect/>
+          </a:stretch>
+        </p:blipFill>
+        <p:spPr>
+          <a:xfrm>
+            <a:off x="4751161" y="4398265"/>
+            <a:ext cx="2689678" cy="1529062"/>
+          </a:xfrm>
+          <a:prstGeom prst="rect">
+            <a:avLst/>
+          </a:prstGeom>
+        </p:spPr>
+      </p:pic>
+      <p:sp>
+        <p:nvSpPr>
+          <p:cNvPr id="14" name="TextBox 13">
+            <a:extLst>
+              <a:ext uri="{FF2B5EF4-FFF2-40B4-BE49-F238E27FC236}">
+                <a16:creationId xmlns:a16="http://schemas.microsoft.com/office/drawing/2014/main" xmlns="" id="{69F81465-6DFE-4098-8458-39E005A83CA5}"/>
+              </a:ext>
+            </a:extLst>
+          </p:cNvPr>
+          <p:cNvSpPr txBox="1"/>
+          <p:nvPr/>
+        </p:nvSpPr>
+        <p:spPr>
+          <a:xfrm>
+            <a:off x="4490422" y="5872619"/>
+            <a:ext cx="3211156" cy="323165"/>
+          </a:xfrm>
+          <a:prstGeom prst="rect">
+            <a:avLst/>
+          </a:prstGeom>
+          <a:noFill/>
+          <a:ln>
+            <a:noFill/>
+          </a:ln>
+        </p:spPr>
+        <p:txBody>
+          <a:bodyPr wrap="square" rtlCol="0">
+            <a:spAutoFit/>
+          </a:bodyPr>
+          <a:lstStyle/>
+          <a:p>
+            <a:pPr algn="ctr"/>
+            <a:r>
+              <a:rPr lang="ko-KR" altLang="en-US" sz="1500" smtClean="0"/>
+              <a:t>그림 </a:t>
+            </a:r>
+            <a:r>
+              <a:rPr lang="en-US" altLang="ko-KR" sz="1500" dirty="0"/>
+              <a:t>7</a:t>
+            </a:r>
+            <a:r>
+              <a:rPr lang="en-US" altLang="ko-KR" sz="1500" smtClean="0"/>
+              <a:t>. </a:t>
+            </a:r>
+            <a:r>
+              <a:rPr lang="ko-KR" altLang="en-US" sz="1500" smtClean="0"/>
+              <a:t>공식정리</a:t>
+            </a:r>
+            <a:endParaRPr lang="en-US" altLang="ko-KR" sz="1400" dirty="0"/>
+          </a:p>
+        </p:txBody>
+      </p:sp>
+    </p:spTree>
+    <p:extLst>
+      <p:ext uri="{BB962C8B-B14F-4D97-AF65-F5344CB8AC3E}">
+        <p14:creationId xmlns:p14="http://schemas.microsoft.com/office/powerpoint/2010/main" val="1491788736"/>
       </p:ext>
     </p:extLst>
   </p:cSld>

</xml_diff>